<commit_message>
update solution of one problem.
</commit_message>
<xml_diff>
--- a/doc/progress.pptx
+++ b/doc/progress.pptx
@@ -263,7 +263,7 @@
           <a:p>
             <a:fld id="{CF1267A5-9448-410E-9905-2BFAF5898020}" type="datetimeFigureOut">
               <a:rPr lang="en-SG" smtClean="0"/>
-              <a:t>18/11/2021</a:t>
+              <a:t>19/11/2021</a:t>
             </a:fld>
             <a:endParaRPr lang="en-SG"/>
           </a:p>
@@ -463,7 +463,7 @@
           <a:p>
             <a:fld id="{CF1267A5-9448-410E-9905-2BFAF5898020}" type="datetimeFigureOut">
               <a:rPr lang="en-SG" smtClean="0"/>
-              <a:t>18/11/2021</a:t>
+              <a:t>19/11/2021</a:t>
             </a:fld>
             <a:endParaRPr lang="en-SG"/>
           </a:p>
@@ -673,7 +673,7 @@
           <a:p>
             <a:fld id="{CF1267A5-9448-410E-9905-2BFAF5898020}" type="datetimeFigureOut">
               <a:rPr lang="en-SG" smtClean="0"/>
-              <a:t>18/11/2021</a:t>
+              <a:t>19/11/2021</a:t>
             </a:fld>
             <a:endParaRPr lang="en-SG"/>
           </a:p>
@@ -873,7 +873,7 @@
           <a:p>
             <a:fld id="{CF1267A5-9448-410E-9905-2BFAF5898020}" type="datetimeFigureOut">
               <a:rPr lang="en-SG" smtClean="0"/>
-              <a:t>18/11/2021</a:t>
+              <a:t>19/11/2021</a:t>
             </a:fld>
             <a:endParaRPr lang="en-SG"/>
           </a:p>
@@ -1149,7 +1149,7 @@
           <a:p>
             <a:fld id="{CF1267A5-9448-410E-9905-2BFAF5898020}" type="datetimeFigureOut">
               <a:rPr lang="en-SG" smtClean="0"/>
-              <a:t>18/11/2021</a:t>
+              <a:t>19/11/2021</a:t>
             </a:fld>
             <a:endParaRPr lang="en-SG"/>
           </a:p>
@@ -1417,7 +1417,7 @@
           <a:p>
             <a:fld id="{CF1267A5-9448-410E-9905-2BFAF5898020}" type="datetimeFigureOut">
               <a:rPr lang="en-SG" smtClean="0"/>
-              <a:t>18/11/2021</a:t>
+              <a:t>19/11/2021</a:t>
             </a:fld>
             <a:endParaRPr lang="en-SG"/>
           </a:p>
@@ -1832,7 +1832,7 @@
           <a:p>
             <a:fld id="{CF1267A5-9448-410E-9905-2BFAF5898020}" type="datetimeFigureOut">
               <a:rPr lang="en-SG" smtClean="0"/>
-              <a:t>18/11/2021</a:t>
+              <a:t>19/11/2021</a:t>
             </a:fld>
             <a:endParaRPr lang="en-SG"/>
           </a:p>
@@ -1974,7 +1974,7 @@
           <a:p>
             <a:fld id="{CF1267A5-9448-410E-9905-2BFAF5898020}" type="datetimeFigureOut">
               <a:rPr lang="en-SG" smtClean="0"/>
-              <a:t>18/11/2021</a:t>
+              <a:t>19/11/2021</a:t>
             </a:fld>
             <a:endParaRPr lang="en-SG"/>
           </a:p>
@@ -2087,7 +2087,7 @@
           <a:p>
             <a:fld id="{CF1267A5-9448-410E-9905-2BFAF5898020}" type="datetimeFigureOut">
               <a:rPr lang="en-SG" smtClean="0"/>
-              <a:t>18/11/2021</a:t>
+              <a:t>19/11/2021</a:t>
             </a:fld>
             <a:endParaRPr lang="en-SG"/>
           </a:p>
@@ -2400,7 +2400,7 @@
           <a:p>
             <a:fld id="{CF1267A5-9448-410E-9905-2BFAF5898020}" type="datetimeFigureOut">
               <a:rPr lang="en-SG" smtClean="0"/>
-              <a:t>18/11/2021</a:t>
+              <a:t>19/11/2021</a:t>
             </a:fld>
             <a:endParaRPr lang="en-SG"/>
           </a:p>
@@ -2689,7 +2689,7 @@
           <a:p>
             <a:fld id="{CF1267A5-9448-410E-9905-2BFAF5898020}" type="datetimeFigureOut">
               <a:rPr lang="en-SG" smtClean="0"/>
-              <a:t>18/11/2021</a:t>
+              <a:t>19/11/2021</a:t>
             </a:fld>
             <a:endParaRPr lang="en-SG"/>
           </a:p>
@@ -2932,7 +2932,7 @@
           <a:p>
             <a:fld id="{CF1267A5-9448-410E-9905-2BFAF5898020}" type="datetimeFigureOut">
               <a:rPr lang="en-SG" smtClean="0"/>
-              <a:t>18/11/2021</a:t>
+              <a:t>19/11/2021</a:t>
             </a:fld>
             <a:endParaRPr lang="en-SG"/>
           </a:p>
@@ -5448,8 +5448,8 @@
         </p:blipFill>
         <p:spPr>
           <a:xfrm>
-            <a:off x="5634045" y="708005"/>
-            <a:ext cx="6421860" cy="3874844"/>
+            <a:off x="5634044" y="729496"/>
+            <a:ext cx="6285561" cy="3792605"/>
           </a:xfrm>
           <a:prstGeom prst="rect">
             <a:avLst/>
@@ -5634,8 +5634,8 @@
         </p:blipFill>
         <p:spPr>
           <a:xfrm>
-            <a:off x="409205" y="420610"/>
-            <a:ext cx="5094950" cy="2874413"/>
+            <a:off x="409205" y="420611"/>
+            <a:ext cx="5094948" cy="2874412"/>
           </a:xfrm>
           <a:prstGeom prst="rect">
             <a:avLst/>
@@ -5849,7 +5849,7 @@
         <p:spPr>
           <a:xfrm>
             <a:off x="6287034" y="4908570"/>
-            <a:ext cx="4978729" cy="1292662"/>
+            <a:ext cx="4978729" cy="1477328"/>
           </a:xfrm>
           <a:prstGeom prst="rect">
             <a:avLst/>
@@ -5872,7 +5872,19 @@
             </a:r>
             <a:r>
               <a:rPr lang="en-SG" sz="1200" dirty="0"/>
-              <a:t> driver: </a:t>
+              <a:t> driver n-375 and </a:t>
+            </a:r>
+            <a:r>
+              <a:rPr lang="en-SG" sz="1200" b="1" i="0" u="none" strike="noStrike" dirty="0">
+                <a:effectLst/>
+                <a:latin typeface="-apple-system"/>
+                <a:hlinkClick r:id="rId5"/>
+              </a:rPr>
+              <a:t>light-the-torch</a:t>
+            </a:r>
+            <a:r>
+              <a:rPr lang="en-SG" sz="1200" dirty="0"/>
+              <a:t> : </a:t>
             </a:r>
           </a:p>
           <a:p>
@@ -5896,7 +5908,7 @@
                 </a:solidFill>
                 <a:effectLst/>
                 <a:latin typeface="inherit"/>
-                <a:hlinkClick r:id="rId5"/>
+                <a:hlinkClick r:id="rId6"/>
               </a:rPr>
               <a:t>Boot to a root shell</a:t>
             </a:r>

</xml_diff>

<commit_message>
Added the NCS template.
</commit_message>
<xml_diff>
--- a/doc/progress.pptx
+++ b/doc/progress.pptx
@@ -8,6 +8,7 @@
     <p:sldId id="2076137610" r:id="rId2"/>
     <p:sldId id="2076137611" r:id="rId3"/>
     <p:sldId id="2076137612" r:id="rId4"/>
+    <p:sldId id="287" r:id="rId5"/>
   </p:sldIdLst>
   <p:sldSz cx="12192000" cy="6858000"/>
   <p:notesSz cx="6858000" cy="9144000"/>
@@ -263,7 +264,7 @@
           <a:p>
             <a:fld id="{CF1267A5-9448-410E-9905-2BFAF5898020}" type="datetimeFigureOut">
               <a:rPr lang="en-SG" smtClean="0"/>
-              <a:t>19/11/2021</a:t>
+              <a:t>25/11/2021</a:t>
             </a:fld>
             <a:endParaRPr lang="en-SG"/>
           </a:p>
@@ -463,7 +464,7 @@
           <a:p>
             <a:fld id="{CF1267A5-9448-410E-9905-2BFAF5898020}" type="datetimeFigureOut">
               <a:rPr lang="en-SG" smtClean="0"/>
-              <a:t>19/11/2021</a:t>
+              <a:t>25/11/2021</a:t>
             </a:fld>
             <a:endParaRPr lang="en-SG"/>
           </a:p>
@@ -673,7 +674,7 @@
           <a:p>
             <a:fld id="{CF1267A5-9448-410E-9905-2BFAF5898020}" type="datetimeFigureOut">
               <a:rPr lang="en-SG" smtClean="0"/>
-              <a:t>19/11/2021</a:t>
+              <a:t>25/11/2021</a:t>
             </a:fld>
             <a:endParaRPr lang="en-SG"/>
           </a:p>
@@ -743,6 +744,1211 @@
   <p:clrMapOvr>
     <a:masterClrMapping/>
   </p:clrMapOvr>
+</p:sldLayout>
+</file>
+
+<file path=ppt/slideLayouts/slideLayout12.xml><?xml version="1.0" encoding="utf-8"?>
+<p:sldLayout xmlns:a="http://schemas.openxmlformats.org/drawingml/2006/main" xmlns:r="http://schemas.openxmlformats.org/officeDocument/2006/relationships" xmlns:p="http://schemas.openxmlformats.org/presentationml/2006/main" userDrawn="1">
+  <p:cSld name="1_content_white_3col">
+    <p:spTree>
+      <p:nvGrpSpPr>
+        <p:cNvPr id="1" name=""/>
+        <p:cNvGrpSpPr/>
+        <p:nvPr/>
+      </p:nvGrpSpPr>
+      <p:grpSpPr>
+        <a:xfrm>
+          <a:off x="0" y="0"/>
+          <a:ext cx="0" cy="0"/>
+          <a:chOff x="0" y="0"/>
+          <a:chExt cx="0" cy="0"/>
+        </a:xfrm>
+      </p:grpSpPr>
+      <p:sp>
+        <p:nvSpPr>
+          <p:cNvPr id="17" name="Title 16">
+            <a:extLst>
+              <a:ext uri="{FF2B5EF4-FFF2-40B4-BE49-F238E27FC236}">
+                <a16:creationId xmlns:a16="http://schemas.microsoft.com/office/drawing/2014/main" id="{B4193CD3-57CC-3646-ADC6-B94398AA05D5}"/>
+              </a:ext>
+            </a:extLst>
+          </p:cNvPr>
+          <p:cNvSpPr>
+            <a:spLocks noGrp="1"/>
+          </p:cNvSpPr>
+          <p:nvPr>
+            <p:ph type="title" hasCustomPrompt="1"/>
+          </p:nvPr>
+        </p:nvSpPr>
+        <p:spPr>
+          <a:xfrm>
+            <a:off x="601883" y="365126"/>
+            <a:ext cx="10995949" cy="803918"/>
+          </a:xfrm>
+          <a:prstGeom prst="rect">
+            <a:avLst/>
+          </a:prstGeom>
+        </p:spPr>
+        <p:txBody>
+          <a:bodyPr/>
+          <a:lstStyle>
+            <a:lvl1pPr>
+              <a:defRPr sz="2400" b="1">
+                <a:solidFill>
+                  <a:schemeClr val="tx2"/>
+                </a:solidFill>
+                <a:latin typeface="Ubuntu" panose="020B0504030602030204" pitchFamily="34" charset="0"/>
+              </a:defRPr>
+            </a:lvl1pPr>
+          </a:lstStyle>
+          <a:p>
+            <a:r>
+              <a:rPr lang="en-GB"/>
+              <a:t>Slide title goes here lorem ipsum</a:t>
+            </a:r>
+            <a:br>
+              <a:rPr lang="en-GB"/>
+            </a:br>
+            <a:r>
+              <a:rPr lang="en-GB"/>
+              <a:t>Slide title goes here lorem ipsum</a:t>
+            </a:r>
+            <a:endParaRPr lang="en-US"/>
+          </a:p>
+        </p:txBody>
+      </p:sp>
+      <p:sp>
+        <p:nvSpPr>
+          <p:cNvPr id="19" name="Text Placeholder 18">
+            <a:extLst>
+              <a:ext uri="{FF2B5EF4-FFF2-40B4-BE49-F238E27FC236}">
+                <a16:creationId xmlns:a16="http://schemas.microsoft.com/office/drawing/2014/main" id="{9A49AA63-AC29-BD4E-BC06-561B10EFC788}"/>
+              </a:ext>
+            </a:extLst>
+          </p:cNvPr>
+          <p:cNvSpPr>
+            <a:spLocks noGrp="1"/>
+          </p:cNvSpPr>
+          <p:nvPr>
+            <p:ph type="body" sz="quarter" idx="10" hasCustomPrompt="1"/>
+          </p:nvPr>
+        </p:nvSpPr>
+        <p:spPr>
+          <a:xfrm>
+            <a:off x="601663" y="1470025"/>
+            <a:ext cx="3533015" cy="4042880"/>
+          </a:xfrm>
+          <a:prstGeom prst="rect">
+            <a:avLst/>
+          </a:prstGeom>
+        </p:spPr>
+        <p:txBody>
+          <a:bodyPr/>
+          <a:lstStyle>
+            <a:lvl1pPr marL="0" indent="0">
+              <a:lnSpc>
+                <a:spcPct val="110000"/>
+              </a:lnSpc>
+              <a:spcBef>
+                <a:spcPts val="2200"/>
+              </a:spcBef>
+              <a:buNone/>
+              <a:defRPr sz="1400">
+                <a:latin typeface="Ubuntu" panose="020B0504030602030204" pitchFamily="34" charset="0"/>
+              </a:defRPr>
+            </a:lvl1pPr>
+          </a:lstStyle>
+          <a:p>
+            <a:pPr lvl="0"/>
+            <a:r>
+              <a:rPr lang="en-SG"/>
+              <a:t>Content Lorem ipsum dolor sit amet, consectetur adipiscing elit. Donec ligula metus, dapibus quis placerat vel, bibendum eget justo. Ut gravida commodo neque, sit amet venenatis est tristique at. Ut vitae venenatis enim, sit amet dictum nunc. Etiam ac ornare diam. </a:t>
+            </a:r>
+            <a:endParaRPr lang="en-US"/>
+          </a:p>
+        </p:txBody>
+      </p:sp>
+      <p:sp>
+        <p:nvSpPr>
+          <p:cNvPr id="9" name="Text Placeholder 18">
+            <a:extLst>
+              <a:ext uri="{FF2B5EF4-FFF2-40B4-BE49-F238E27FC236}">
+                <a16:creationId xmlns:a16="http://schemas.microsoft.com/office/drawing/2014/main" id="{21954483-56A7-6D48-9F06-1BBCEEC6FC83}"/>
+              </a:ext>
+            </a:extLst>
+          </p:cNvPr>
+          <p:cNvSpPr>
+            <a:spLocks noGrp="1"/>
+          </p:cNvSpPr>
+          <p:nvPr>
+            <p:ph type="body" sz="quarter" idx="11" hasCustomPrompt="1"/>
+          </p:nvPr>
+        </p:nvSpPr>
+        <p:spPr>
+          <a:xfrm>
+            <a:off x="4325524" y="1470025"/>
+            <a:ext cx="3533015" cy="4042880"/>
+          </a:xfrm>
+          <a:prstGeom prst="rect">
+            <a:avLst/>
+          </a:prstGeom>
+        </p:spPr>
+        <p:txBody>
+          <a:bodyPr/>
+          <a:lstStyle>
+            <a:lvl1pPr marL="0" indent="0">
+              <a:lnSpc>
+                <a:spcPct val="110000"/>
+              </a:lnSpc>
+              <a:spcBef>
+                <a:spcPts val="2200"/>
+              </a:spcBef>
+              <a:buNone/>
+              <a:defRPr sz="1400">
+                <a:latin typeface="Ubuntu" panose="020B0504030602030204" pitchFamily="34" charset="0"/>
+              </a:defRPr>
+            </a:lvl1pPr>
+          </a:lstStyle>
+          <a:p>
+            <a:pPr lvl="0"/>
+            <a:r>
+              <a:rPr lang="en-SG"/>
+              <a:t>Content Lorem ipsum dolor sit amet, consectetur adipiscing elit. Donec ligula metus, dapibus quis placerat vel, bibendum eget justo. Ut gravida commodo neque, sit amet venenatis est tristique at. Ut vitae venenatis enim, sit amet dictum nunc. Etiam ac ornare diam. </a:t>
+            </a:r>
+            <a:endParaRPr lang="en-US"/>
+          </a:p>
+        </p:txBody>
+      </p:sp>
+      <p:sp>
+        <p:nvSpPr>
+          <p:cNvPr id="10" name="Text Placeholder 18">
+            <a:extLst>
+              <a:ext uri="{FF2B5EF4-FFF2-40B4-BE49-F238E27FC236}">
+                <a16:creationId xmlns:a16="http://schemas.microsoft.com/office/drawing/2014/main" id="{BB380EF6-14B1-9A49-B783-2E84AA5EA0B9}"/>
+              </a:ext>
+            </a:extLst>
+          </p:cNvPr>
+          <p:cNvSpPr>
+            <a:spLocks noGrp="1"/>
+          </p:cNvSpPr>
+          <p:nvPr>
+            <p:ph type="body" sz="quarter" idx="12" hasCustomPrompt="1"/>
+          </p:nvPr>
+        </p:nvSpPr>
+        <p:spPr>
+          <a:xfrm>
+            <a:off x="8049385" y="1470025"/>
+            <a:ext cx="3533015" cy="4042880"/>
+          </a:xfrm>
+          <a:prstGeom prst="rect">
+            <a:avLst/>
+          </a:prstGeom>
+        </p:spPr>
+        <p:txBody>
+          <a:bodyPr/>
+          <a:lstStyle>
+            <a:lvl1pPr marL="0" indent="0">
+              <a:lnSpc>
+                <a:spcPct val="110000"/>
+              </a:lnSpc>
+              <a:spcBef>
+                <a:spcPts val="2200"/>
+              </a:spcBef>
+              <a:buNone/>
+              <a:defRPr sz="1400">
+                <a:latin typeface="Ubuntu" panose="020B0504030602030204" pitchFamily="34" charset="0"/>
+              </a:defRPr>
+            </a:lvl1pPr>
+          </a:lstStyle>
+          <a:p>
+            <a:pPr lvl="0"/>
+            <a:r>
+              <a:rPr lang="en-SG"/>
+              <a:t>Content Lorem ipsum dolor sit amet, consectetur adipiscing elit. Donec ligula metus, dapibus quis placerat vel, bibendum eget justo. Ut gravida commodo neque, sit amet venenatis est tristique at. Ut vitae venenatis enim, sit amet dictum nunc. Etiam ac ornare diam. </a:t>
+            </a:r>
+            <a:endParaRPr lang="en-US"/>
+          </a:p>
+        </p:txBody>
+      </p:sp>
+      <p:cxnSp>
+        <p:nvCxnSpPr>
+          <p:cNvPr id="12" name="Google Shape;65;p14">
+            <a:extLst>
+              <a:ext uri="{FF2B5EF4-FFF2-40B4-BE49-F238E27FC236}">
+                <a16:creationId xmlns:a16="http://schemas.microsoft.com/office/drawing/2014/main" id="{2052BEE0-584E-5743-80B9-A2E5D5845837}"/>
+              </a:ext>
+            </a:extLst>
+          </p:cNvPr>
+          <p:cNvCxnSpPr/>
+          <p:nvPr userDrawn="1"/>
+        </p:nvCxnSpPr>
+        <p:spPr>
+          <a:xfrm>
+            <a:off x="298311" y="6407566"/>
+            <a:ext cx="11595378" cy="0"/>
+          </a:xfrm>
+          <a:prstGeom prst="straightConnector1">
+            <a:avLst/>
+          </a:prstGeom>
+          <a:noFill/>
+          <a:ln w="9525" cap="flat" cmpd="sng">
+            <a:solidFill>
+              <a:srgbClr val="00A7E1"/>
+            </a:solidFill>
+            <a:prstDash val="solid"/>
+            <a:round/>
+            <a:headEnd type="none" w="med" len="med"/>
+            <a:tailEnd type="none" w="med" len="med"/>
+          </a:ln>
+        </p:spPr>
+      </p:cxnSp>
+      <p:sp>
+        <p:nvSpPr>
+          <p:cNvPr id="13" name="TextBox 12">
+            <a:extLst>
+              <a:ext uri="{FF2B5EF4-FFF2-40B4-BE49-F238E27FC236}">
+                <a16:creationId xmlns:a16="http://schemas.microsoft.com/office/drawing/2014/main" id="{BE5CA3DA-2FD8-8842-9430-54B3D35B530F}"/>
+              </a:ext>
+            </a:extLst>
+          </p:cNvPr>
+          <p:cNvSpPr txBox="1"/>
+          <p:nvPr userDrawn="1"/>
+        </p:nvSpPr>
+        <p:spPr>
+          <a:xfrm>
+            <a:off x="10143919" y="6461919"/>
+            <a:ext cx="1819218" cy="184666"/>
+          </a:xfrm>
+          <a:prstGeom prst="rect">
+            <a:avLst/>
+          </a:prstGeom>
+          <a:noFill/>
+        </p:spPr>
+        <p:txBody>
+          <a:bodyPr wrap="square" rtlCol="0">
+            <a:spAutoFit/>
+          </a:bodyPr>
+          <a:lstStyle/>
+          <a:p>
+            <a:pPr algn="r"/>
+            <a:fld id="{8887BFF0-B513-2F4E-8ECC-A2B4BAC9622A}" type="slidenum">
+              <a:rPr lang="en-US" sz="600" smtClean="0">
+                <a:solidFill>
+                  <a:schemeClr val="tx2"/>
+                </a:solidFill>
+                <a:latin typeface="Ubuntu" panose="020B0504030602030204" pitchFamily="34" charset="0"/>
+              </a:rPr>
+              <a:pPr algn="r"/>
+              <a:t>‹#›</a:t>
+            </a:fld>
+            <a:endParaRPr lang="en-US" sz="600">
+              <a:solidFill>
+                <a:schemeClr val="tx2"/>
+              </a:solidFill>
+              <a:latin typeface="Ubuntu" panose="020B0504030602030204" pitchFamily="34" charset="0"/>
+            </a:endParaRPr>
+          </a:p>
+        </p:txBody>
+      </p:sp>
+      <p:cxnSp>
+        <p:nvCxnSpPr>
+          <p:cNvPr id="16" name="Straight Connector 15">
+            <a:extLst>
+              <a:ext uri="{FF2B5EF4-FFF2-40B4-BE49-F238E27FC236}">
+                <a16:creationId xmlns:a16="http://schemas.microsoft.com/office/drawing/2014/main" id="{AEA6204D-20E6-1246-A8C6-95D6751F0F60}"/>
+              </a:ext>
+            </a:extLst>
+          </p:cNvPr>
+          <p:cNvCxnSpPr/>
+          <p:nvPr userDrawn="1"/>
+        </p:nvCxnSpPr>
+        <p:spPr>
+          <a:xfrm flipH="1">
+            <a:off x="1076460" y="6461919"/>
+            <a:ext cx="0" cy="247106"/>
+          </a:xfrm>
+          <a:prstGeom prst="line">
+            <a:avLst/>
+          </a:prstGeom>
+          <a:ln w="9525">
+            <a:solidFill>
+              <a:schemeClr val="accent1"/>
+            </a:solidFill>
+          </a:ln>
+        </p:spPr>
+        <p:style>
+          <a:lnRef idx="1">
+            <a:schemeClr val="accent1"/>
+          </a:lnRef>
+          <a:fillRef idx="0">
+            <a:schemeClr val="accent1"/>
+          </a:fillRef>
+          <a:effectRef idx="0">
+            <a:schemeClr val="accent1"/>
+          </a:effectRef>
+          <a:fontRef idx="minor">
+            <a:schemeClr val="tx1"/>
+          </a:fontRef>
+        </p:style>
+      </p:cxnSp>
+      <p:sp>
+        <p:nvSpPr>
+          <p:cNvPr id="14" name="Google Shape;64;p14">
+            <a:extLst>
+              <a:ext uri="{FF2B5EF4-FFF2-40B4-BE49-F238E27FC236}">
+                <a16:creationId xmlns:a16="http://schemas.microsoft.com/office/drawing/2014/main" id="{801C68B1-61C1-B446-8D6A-E36FA399E9E6}"/>
+              </a:ext>
+            </a:extLst>
+          </p:cNvPr>
+          <p:cNvSpPr txBox="1"/>
+          <p:nvPr userDrawn="1"/>
+        </p:nvSpPr>
+        <p:spPr>
+          <a:xfrm>
+            <a:off x="1076459" y="6395991"/>
+            <a:ext cx="8260579" cy="393600"/>
+          </a:xfrm>
+          <a:prstGeom prst="rect">
+            <a:avLst/>
+          </a:prstGeom>
+          <a:noFill/>
+          <a:ln>
+            <a:noFill/>
+          </a:ln>
+        </p:spPr>
+        <p:txBody>
+          <a:bodyPr spcFirstLastPara="1" wrap="square" lIns="91425" tIns="91425" rIns="91425" bIns="91425" anchor="ctr" anchorCtr="0">
+            <a:noAutofit/>
+          </a:bodyPr>
+          <a:lstStyle/>
+          <a:p>
+            <a:r>
+              <a:rPr lang="en-US" sz="600" b="0" i="0" u="none" strike="noStrike" kern="1200">
+                <a:solidFill>
+                  <a:schemeClr val="tx2"/>
+                </a:solidFill>
+                <a:effectLst/>
+                <a:latin typeface="Ubuntu" panose="020B0504030602030204" pitchFamily="34" charset="0"/>
+                <a:ea typeface="+mn-ea"/>
+                <a:cs typeface="+mn-cs"/>
+              </a:rPr>
+              <a:t>© NCS Pte Ltd 2021. All Rights Reserved. The content of this presentation is proprietary and confidential information of NCS. It is not intended to be distributed without the written consent of NCS.</a:t>
+            </a:r>
+          </a:p>
+        </p:txBody>
+      </p:sp>
+      <p:grpSp>
+        <p:nvGrpSpPr>
+          <p:cNvPr id="15" name="Graphic 4">
+            <a:extLst>
+              <a:ext uri="{FF2B5EF4-FFF2-40B4-BE49-F238E27FC236}">
+                <a16:creationId xmlns:a16="http://schemas.microsoft.com/office/drawing/2014/main" id="{21126305-A27F-483E-B83F-B7CA7478A611}"/>
+              </a:ext>
+            </a:extLst>
+          </p:cNvPr>
+          <p:cNvGrpSpPr/>
+          <p:nvPr userDrawn="1"/>
+        </p:nvGrpSpPr>
+        <p:grpSpPr>
+          <a:xfrm>
+            <a:off x="270243" y="6517798"/>
+            <a:ext cx="724037" cy="161562"/>
+            <a:chOff x="2497995" y="2687207"/>
+            <a:chExt cx="5762625" cy="1285875"/>
+          </a:xfrm>
+        </p:grpSpPr>
+        <p:sp>
+          <p:nvSpPr>
+            <p:cNvPr id="18" name="Freeform: Shape 17">
+              <a:extLst>
+                <a:ext uri="{FF2B5EF4-FFF2-40B4-BE49-F238E27FC236}">
+                  <a16:creationId xmlns:a16="http://schemas.microsoft.com/office/drawing/2014/main" id="{6D6A76E6-6399-4133-BEAF-40706292B6D9}"/>
+                </a:ext>
+              </a:extLst>
+            </p:cNvPr>
+            <p:cNvSpPr/>
+            <p:nvPr/>
+          </p:nvSpPr>
+          <p:spPr>
+            <a:xfrm>
+              <a:off x="6115578" y="2688030"/>
+              <a:ext cx="1028700" cy="1266825"/>
+            </a:xfrm>
+            <a:custGeom>
+              <a:avLst/>
+              <a:gdLst>
+                <a:gd name="connsiteX0" fmla="*/ 838403 w 1028700"/>
+                <a:gd name="connsiteY0" fmla="*/ 25466 h 1266825"/>
+                <a:gd name="connsiteX1" fmla="*/ 14871 w 1028700"/>
+                <a:gd name="connsiteY1" fmla="*/ 1201613 h 1266825"/>
+                <a:gd name="connsiteX2" fmla="*/ 25531 w 1028700"/>
+                <a:gd name="connsiteY2" fmla="*/ 1261422 h 1266825"/>
+                <a:gd name="connsiteX3" fmla="*/ 50113 w 1028700"/>
+                <a:gd name="connsiteY3" fmla="*/ 1269146 h 1266825"/>
+                <a:gd name="connsiteX4" fmla="*/ 379964 w 1028700"/>
+                <a:gd name="connsiteY4" fmla="*/ 1269146 h 1266825"/>
+                <a:gd name="connsiteX5" fmla="*/ 430447 w 1028700"/>
+                <a:gd name="connsiteY5" fmla="*/ 1242857 h 1266825"/>
+                <a:gd name="connsiteX6" fmla="*/ 1019568 w 1028700"/>
+                <a:gd name="connsiteY6" fmla="*/ 401609 h 1266825"/>
+                <a:gd name="connsiteX7" fmla="*/ 1026997 w 1028700"/>
+                <a:gd name="connsiteY7" fmla="*/ 345125 h 1266825"/>
+                <a:gd name="connsiteX8" fmla="*/ 913936 w 1028700"/>
+                <a:gd name="connsiteY8" fmla="*/ 35372 h 1266825"/>
+                <a:gd name="connsiteX9" fmla="*/ 858846 w 1028700"/>
+                <a:gd name="connsiteY9" fmla="*/ 9764 h 1266825"/>
+                <a:gd name="connsiteX10" fmla="*/ 838403 w 1028700"/>
+                <a:gd name="connsiteY10" fmla="*/ 25466 h 1266825"/>
+              </a:gdLst>
+              <a:ahLst/>
+              <a:cxnLst>
+                <a:cxn ang="0">
+                  <a:pos x="connsiteX0" y="connsiteY0"/>
+                </a:cxn>
+                <a:cxn ang="0">
+                  <a:pos x="connsiteX1" y="connsiteY1"/>
+                </a:cxn>
+                <a:cxn ang="0">
+                  <a:pos x="connsiteX2" y="connsiteY2"/>
+                </a:cxn>
+                <a:cxn ang="0">
+                  <a:pos x="connsiteX3" y="connsiteY3"/>
+                </a:cxn>
+                <a:cxn ang="0">
+                  <a:pos x="connsiteX4" y="connsiteY4"/>
+                </a:cxn>
+                <a:cxn ang="0">
+                  <a:pos x="connsiteX5" y="connsiteY5"/>
+                </a:cxn>
+                <a:cxn ang="0">
+                  <a:pos x="connsiteX6" y="connsiteY6"/>
+                </a:cxn>
+                <a:cxn ang="0">
+                  <a:pos x="connsiteX7" y="connsiteY7"/>
+                </a:cxn>
+                <a:cxn ang="0">
+                  <a:pos x="connsiteX8" y="connsiteY8"/>
+                </a:cxn>
+                <a:cxn ang="0">
+                  <a:pos x="connsiteX9" y="connsiteY9"/>
+                </a:cxn>
+                <a:cxn ang="0">
+                  <a:pos x="connsiteX10" y="connsiteY10"/>
+                </a:cxn>
+              </a:cxnLst>
+              <a:rect l="l" t="t" r="r" b="b"/>
+              <a:pathLst>
+                <a:path w="1028700" h="1266825">
+                  <a:moveTo>
+                    <a:pt x="838403" y="25466"/>
+                  </a:moveTo>
+                  <a:lnTo>
+                    <a:pt x="14871" y="1201613"/>
+                  </a:lnTo>
+                  <a:cubicBezTo>
+                    <a:pt x="1299" y="1221073"/>
+                    <a:pt x="6071" y="1247850"/>
+                    <a:pt x="25531" y="1261422"/>
+                  </a:cubicBezTo>
+                  <a:cubicBezTo>
+                    <a:pt x="32742" y="1266452"/>
+                    <a:pt x="41322" y="1269147"/>
+                    <a:pt x="50113" y="1269146"/>
+                  </a:cubicBezTo>
+                  <a:lnTo>
+                    <a:pt x="379964" y="1269146"/>
+                  </a:lnTo>
+                  <a:cubicBezTo>
+                    <a:pt x="400077" y="1269160"/>
+                    <a:pt x="418927" y="1259344"/>
+                    <a:pt x="430447" y="1242857"/>
+                  </a:cubicBezTo>
+                  <a:lnTo>
+                    <a:pt x="1019568" y="401609"/>
+                  </a:lnTo>
+                  <a:cubicBezTo>
+                    <a:pt x="1031090" y="385112"/>
+                    <a:pt x="1033861" y="364040"/>
+                    <a:pt x="1026997" y="345125"/>
+                  </a:cubicBezTo>
+                  <a:lnTo>
+                    <a:pt x="913936" y="35372"/>
+                  </a:lnTo>
+                  <a:cubicBezTo>
+                    <a:pt x="905795" y="13088"/>
+                    <a:pt x="881130" y="1623"/>
+                    <a:pt x="858846" y="9764"/>
+                  </a:cubicBezTo>
+                  <a:cubicBezTo>
+                    <a:pt x="850584" y="12782"/>
+                    <a:pt x="843449" y="18263"/>
+                    <a:pt x="838403" y="25466"/>
+                  </a:cubicBezTo>
+                  <a:close/>
+                </a:path>
+              </a:pathLst>
+            </a:custGeom>
+            <a:solidFill>
+              <a:srgbClr val="00A7E1"/>
+            </a:solidFill>
+            <a:ln w="9525" cap="flat">
+              <a:noFill/>
+              <a:prstDash val="solid"/>
+              <a:miter/>
+            </a:ln>
+          </p:spPr>
+          <p:txBody>
+            <a:bodyPr rtlCol="0" anchor="ctr"/>
+            <a:lstStyle/>
+            <a:p>
+              <a:endParaRPr lang="en-US"/>
+            </a:p>
+          </p:txBody>
+        </p:sp>
+        <p:sp>
+          <p:nvSpPr>
+            <p:cNvPr id="20" name="Freeform: Shape 19">
+              <a:extLst>
+                <a:ext uri="{FF2B5EF4-FFF2-40B4-BE49-F238E27FC236}">
+                  <a16:creationId xmlns:a16="http://schemas.microsoft.com/office/drawing/2014/main" id="{B2D8FC94-8779-49E3-B001-E3098624C063}"/>
+                </a:ext>
+              </a:extLst>
+            </p:cNvPr>
+            <p:cNvSpPr/>
+            <p:nvPr/>
+          </p:nvSpPr>
+          <p:spPr>
+            <a:xfrm>
+              <a:off x="7231355" y="2687969"/>
+              <a:ext cx="1028700" cy="1266825"/>
+            </a:xfrm>
+            <a:custGeom>
+              <a:avLst/>
+              <a:gdLst>
+                <a:gd name="connsiteX0" fmla="*/ 987831 w 1028700"/>
+                <a:gd name="connsiteY0" fmla="*/ 7144 h 1266825"/>
+                <a:gd name="connsiteX1" fmla="*/ 657790 w 1028700"/>
+                <a:gd name="connsiteY1" fmla="*/ 7144 h 1266825"/>
+                <a:gd name="connsiteX2" fmla="*/ 607307 w 1028700"/>
+                <a:gd name="connsiteY2" fmla="*/ 33433 h 1266825"/>
+                <a:gd name="connsiteX3" fmla="*/ 18281 w 1028700"/>
+                <a:gd name="connsiteY3" fmla="*/ 874776 h 1266825"/>
+                <a:gd name="connsiteX4" fmla="*/ 10851 w 1028700"/>
+                <a:gd name="connsiteY4" fmla="*/ 931164 h 1266825"/>
+                <a:gd name="connsiteX5" fmla="*/ 123628 w 1028700"/>
+                <a:gd name="connsiteY5" fmla="*/ 1240917 h 1266825"/>
+                <a:gd name="connsiteX6" fmla="*/ 178875 w 1028700"/>
+                <a:gd name="connsiteY6" fmla="*/ 1266184 h 1266825"/>
+                <a:gd name="connsiteX7" fmla="*/ 199161 w 1028700"/>
+                <a:gd name="connsiteY7" fmla="*/ 1250442 h 1266825"/>
+                <a:gd name="connsiteX8" fmla="*/ 1022978 w 1028700"/>
+                <a:gd name="connsiteY8" fmla="*/ 74771 h 1266825"/>
+                <a:gd name="connsiteX9" fmla="*/ 1012480 w 1028700"/>
+                <a:gd name="connsiteY9" fmla="*/ 14934 h 1266825"/>
+                <a:gd name="connsiteX10" fmla="*/ 987831 w 1028700"/>
+                <a:gd name="connsiteY10" fmla="*/ 7144 h 1266825"/>
+              </a:gdLst>
+              <a:ahLst/>
+              <a:cxnLst>
+                <a:cxn ang="0">
+                  <a:pos x="connsiteX0" y="connsiteY0"/>
+                </a:cxn>
+                <a:cxn ang="0">
+                  <a:pos x="connsiteX1" y="connsiteY1"/>
+                </a:cxn>
+                <a:cxn ang="0">
+                  <a:pos x="connsiteX2" y="connsiteY2"/>
+                </a:cxn>
+                <a:cxn ang="0">
+                  <a:pos x="connsiteX3" y="connsiteY3"/>
+                </a:cxn>
+                <a:cxn ang="0">
+                  <a:pos x="connsiteX4" y="connsiteY4"/>
+                </a:cxn>
+                <a:cxn ang="0">
+                  <a:pos x="connsiteX5" y="connsiteY5"/>
+                </a:cxn>
+                <a:cxn ang="0">
+                  <a:pos x="connsiteX6" y="connsiteY6"/>
+                </a:cxn>
+                <a:cxn ang="0">
+                  <a:pos x="connsiteX7" y="connsiteY7"/>
+                </a:cxn>
+                <a:cxn ang="0">
+                  <a:pos x="connsiteX8" y="connsiteY8"/>
+                </a:cxn>
+                <a:cxn ang="0">
+                  <a:pos x="connsiteX9" y="connsiteY9"/>
+                </a:cxn>
+                <a:cxn ang="0">
+                  <a:pos x="connsiteX10" y="connsiteY10"/>
+                </a:cxn>
+              </a:cxnLst>
+              <a:rect l="l" t="t" r="r" b="b"/>
+              <a:pathLst>
+                <a:path w="1028700" h="1266825">
+                  <a:moveTo>
+                    <a:pt x="987831" y="7144"/>
+                  </a:moveTo>
+                  <a:lnTo>
+                    <a:pt x="657790" y="7144"/>
+                  </a:lnTo>
+                  <a:cubicBezTo>
+                    <a:pt x="637681" y="7146"/>
+                    <a:pt x="618838" y="16958"/>
+                    <a:pt x="607307" y="33433"/>
+                  </a:cubicBezTo>
+                  <a:lnTo>
+                    <a:pt x="18281" y="874776"/>
+                  </a:lnTo>
+                  <a:cubicBezTo>
+                    <a:pt x="6760" y="891237"/>
+                    <a:pt x="3988" y="912281"/>
+                    <a:pt x="10851" y="931164"/>
+                  </a:cubicBezTo>
+                  <a:lnTo>
+                    <a:pt x="123628" y="1240917"/>
+                  </a:lnTo>
+                  <a:cubicBezTo>
+                    <a:pt x="131907" y="1263151"/>
+                    <a:pt x="156642" y="1274463"/>
+                    <a:pt x="178875" y="1266184"/>
+                  </a:cubicBezTo>
+                  <a:cubicBezTo>
+                    <a:pt x="187084" y="1263128"/>
+                    <a:pt x="194162" y="1257635"/>
+                    <a:pt x="199161" y="1250442"/>
+                  </a:cubicBezTo>
+                  <a:lnTo>
+                    <a:pt x="1022978" y="74771"/>
+                  </a:lnTo>
+                  <a:cubicBezTo>
+                    <a:pt x="1036603" y="55349"/>
+                    <a:pt x="1031903" y="28558"/>
+                    <a:pt x="1012480" y="14934"/>
+                  </a:cubicBezTo>
+                  <a:cubicBezTo>
+                    <a:pt x="1005259" y="9868"/>
+                    <a:pt x="996652" y="7148"/>
+                    <a:pt x="987831" y="7144"/>
+                  </a:cubicBezTo>
+                  <a:close/>
+                </a:path>
+              </a:pathLst>
+            </a:custGeom>
+            <a:solidFill>
+              <a:srgbClr val="00A7E1"/>
+            </a:solidFill>
+            <a:ln w="9525" cap="flat">
+              <a:noFill/>
+              <a:prstDash val="solid"/>
+              <a:miter/>
+            </a:ln>
+          </p:spPr>
+          <p:txBody>
+            <a:bodyPr rtlCol="0" anchor="ctr"/>
+            <a:lstStyle/>
+            <a:p>
+              <a:endParaRPr lang="en-US"/>
+            </a:p>
+          </p:txBody>
+        </p:sp>
+        <p:sp>
+          <p:nvSpPr>
+            <p:cNvPr id="21" name="Freeform: Shape 20">
+              <a:extLst>
+                <a:ext uri="{FF2B5EF4-FFF2-40B4-BE49-F238E27FC236}">
+                  <a16:creationId xmlns:a16="http://schemas.microsoft.com/office/drawing/2014/main" id="{C7C0FDEE-CDF0-4C1A-962B-792F5A6233D6}"/>
+                </a:ext>
+              </a:extLst>
+            </p:cNvPr>
+            <p:cNvSpPr/>
+            <p:nvPr/>
+          </p:nvSpPr>
+          <p:spPr>
+            <a:xfrm>
+              <a:off x="2490851" y="2690776"/>
+              <a:ext cx="1114425" cy="1266825"/>
+            </a:xfrm>
+            <a:custGeom>
+              <a:avLst/>
+              <a:gdLst>
+                <a:gd name="connsiteX0" fmla="*/ 522161 w 1114425"/>
+                <a:gd name="connsiteY0" fmla="*/ 8052 h 1266825"/>
+                <a:gd name="connsiteX1" fmla="*/ 1111187 w 1114425"/>
+                <a:gd name="connsiteY1" fmla="*/ 590315 h 1266825"/>
+                <a:gd name="connsiteX2" fmla="*/ 1111187 w 1114425"/>
+                <a:gd name="connsiteY2" fmla="*/ 1266590 h 1266825"/>
+                <a:gd name="connsiteX3" fmla="*/ 777812 w 1114425"/>
+                <a:gd name="connsiteY3" fmla="*/ 1266590 h 1266825"/>
+                <a:gd name="connsiteX4" fmla="*/ 777812 w 1114425"/>
+                <a:gd name="connsiteY4" fmla="*/ 634606 h 1266825"/>
+                <a:gd name="connsiteX5" fmla="*/ 475012 w 1114425"/>
+                <a:gd name="connsiteY5" fmla="*/ 310756 h 1266825"/>
+                <a:gd name="connsiteX6" fmla="*/ 343757 w 1114425"/>
+                <a:gd name="connsiteY6" fmla="*/ 310756 h 1266825"/>
+                <a:gd name="connsiteX7" fmla="*/ 343757 w 1114425"/>
+                <a:gd name="connsiteY7" fmla="*/ 1266876 h 1266825"/>
+                <a:gd name="connsiteX8" fmla="*/ 7144 w 1114425"/>
+                <a:gd name="connsiteY8" fmla="*/ 1266876 h 1266825"/>
+                <a:gd name="connsiteX9" fmla="*/ 7144 w 1114425"/>
+                <a:gd name="connsiteY9" fmla="*/ 8052 h 1266825"/>
+              </a:gdLst>
+              <a:ahLst/>
+              <a:cxnLst>
+                <a:cxn ang="0">
+                  <a:pos x="connsiteX0" y="connsiteY0"/>
+                </a:cxn>
+                <a:cxn ang="0">
+                  <a:pos x="connsiteX1" y="connsiteY1"/>
+                </a:cxn>
+                <a:cxn ang="0">
+                  <a:pos x="connsiteX2" y="connsiteY2"/>
+                </a:cxn>
+                <a:cxn ang="0">
+                  <a:pos x="connsiteX3" y="connsiteY3"/>
+                </a:cxn>
+                <a:cxn ang="0">
+                  <a:pos x="connsiteX4" y="connsiteY4"/>
+                </a:cxn>
+                <a:cxn ang="0">
+                  <a:pos x="connsiteX5" y="connsiteY5"/>
+                </a:cxn>
+                <a:cxn ang="0">
+                  <a:pos x="connsiteX6" y="connsiteY6"/>
+                </a:cxn>
+                <a:cxn ang="0">
+                  <a:pos x="connsiteX7" y="connsiteY7"/>
+                </a:cxn>
+                <a:cxn ang="0">
+                  <a:pos x="connsiteX8" y="connsiteY8"/>
+                </a:cxn>
+                <a:cxn ang="0">
+                  <a:pos x="connsiteX9" y="connsiteY9"/>
+                </a:cxn>
+              </a:cxnLst>
+              <a:rect l="l" t="t" r="r" b="b"/>
+              <a:pathLst>
+                <a:path w="1114425" h="1266825">
+                  <a:moveTo>
+                    <a:pt x="522161" y="8052"/>
+                  </a:moveTo>
+                  <a:cubicBezTo>
+                    <a:pt x="905828" y="-8807"/>
+                    <a:pt x="1127951" y="209982"/>
+                    <a:pt x="1111187" y="590315"/>
+                  </a:cubicBezTo>
+                  <a:lnTo>
+                    <a:pt x="1111187" y="1266590"/>
+                  </a:lnTo>
+                  <a:lnTo>
+                    <a:pt x="777812" y="1266590"/>
+                  </a:lnTo>
+                  <a:lnTo>
+                    <a:pt x="777812" y="634606"/>
+                  </a:lnTo>
+                  <a:cubicBezTo>
+                    <a:pt x="781336" y="391719"/>
+                    <a:pt x="707231" y="310756"/>
+                    <a:pt x="475012" y="310756"/>
+                  </a:cubicBezTo>
+                  <a:lnTo>
+                    <a:pt x="343757" y="310756"/>
+                  </a:lnTo>
+                  <a:lnTo>
+                    <a:pt x="343757" y="1266876"/>
+                  </a:lnTo>
+                  <a:lnTo>
+                    <a:pt x="7144" y="1266876"/>
+                  </a:lnTo>
+                  <a:lnTo>
+                    <a:pt x="7144" y="8052"/>
+                  </a:lnTo>
+                  <a:close/>
+                </a:path>
+              </a:pathLst>
+            </a:custGeom>
+            <a:solidFill>
+              <a:schemeClr val="tx1"/>
+            </a:solidFill>
+            <a:ln w="9525" cap="flat">
+              <a:noFill/>
+              <a:prstDash val="solid"/>
+              <a:miter/>
+            </a:ln>
+          </p:spPr>
+          <p:txBody>
+            <a:bodyPr rtlCol="0" anchor="ctr"/>
+            <a:lstStyle/>
+            <a:p>
+              <a:endParaRPr lang="en-US"/>
+            </a:p>
+          </p:txBody>
+        </p:sp>
+        <p:sp>
+          <p:nvSpPr>
+            <p:cNvPr id="22" name="Freeform: Shape 21">
+              <a:extLst>
+                <a:ext uri="{FF2B5EF4-FFF2-40B4-BE49-F238E27FC236}">
+                  <a16:creationId xmlns:a16="http://schemas.microsoft.com/office/drawing/2014/main" id="{67B432C1-E916-4FE7-BC77-FAEECBEBC9AB}"/>
+                </a:ext>
+              </a:extLst>
+            </p:cNvPr>
+            <p:cNvSpPr/>
+            <p:nvPr/>
+          </p:nvSpPr>
+          <p:spPr>
+            <a:xfrm>
+              <a:off x="5056219" y="2680063"/>
+              <a:ext cx="838200" cy="1295400"/>
+            </a:xfrm>
+            <a:custGeom>
+              <a:avLst/>
+              <a:gdLst>
+                <a:gd name="connsiteX0" fmla="*/ 543306 w 838200"/>
+                <a:gd name="connsiteY0" fmla="*/ 524066 h 1295400"/>
+                <a:gd name="connsiteX1" fmla="*/ 457010 w 838200"/>
+                <a:gd name="connsiteY1" fmla="*/ 496538 h 1295400"/>
+                <a:gd name="connsiteX2" fmla="*/ 322993 w 838200"/>
+                <a:gd name="connsiteY2" fmla="*/ 378524 h 1295400"/>
+                <a:gd name="connsiteX3" fmla="*/ 450056 w 838200"/>
+                <a:gd name="connsiteY3" fmla="*/ 276511 h 1295400"/>
+                <a:gd name="connsiteX4" fmla="*/ 621982 w 838200"/>
+                <a:gd name="connsiteY4" fmla="*/ 308324 h 1295400"/>
+                <a:gd name="connsiteX5" fmla="*/ 774383 w 838200"/>
+                <a:gd name="connsiteY5" fmla="*/ 90869 h 1295400"/>
+                <a:gd name="connsiteX6" fmla="*/ 441008 w 838200"/>
+                <a:gd name="connsiteY6" fmla="*/ 7144 h 1295400"/>
+                <a:gd name="connsiteX7" fmla="*/ 26289 w 838200"/>
+                <a:gd name="connsiteY7" fmla="*/ 389001 h 1295400"/>
+                <a:gd name="connsiteX8" fmla="*/ 303276 w 838200"/>
+                <a:gd name="connsiteY8" fmla="*/ 751523 h 1295400"/>
+                <a:gd name="connsiteX9" fmla="*/ 510635 w 838200"/>
+                <a:gd name="connsiteY9" fmla="*/ 906018 h 1295400"/>
+                <a:gd name="connsiteX10" fmla="*/ 423101 w 838200"/>
+                <a:gd name="connsiteY10" fmla="*/ 1003840 h 1295400"/>
+                <a:gd name="connsiteX11" fmla="*/ 169069 w 838200"/>
+                <a:gd name="connsiteY11" fmla="*/ 961168 h 1295400"/>
+                <a:gd name="connsiteX12" fmla="*/ 7144 w 838200"/>
+                <a:gd name="connsiteY12" fmla="*/ 1191673 h 1295400"/>
+                <a:gd name="connsiteX13" fmla="*/ 325279 w 838200"/>
+                <a:gd name="connsiteY13" fmla="*/ 1294924 h 1295400"/>
+                <a:gd name="connsiteX14" fmla="*/ 838676 w 838200"/>
+                <a:gd name="connsiteY14" fmla="*/ 894874 h 1295400"/>
+                <a:gd name="connsiteX15" fmla="*/ 543306 w 838200"/>
+                <a:gd name="connsiteY15" fmla="*/ 524066 h 1295400"/>
+              </a:gdLst>
+              <a:ahLst/>
+              <a:cxnLst>
+                <a:cxn ang="0">
+                  <a:pos x="connsiteX0" y="connsiteY0"/>
+                </a:cxn>
+                <a:cxn ang="0">
+                  <a:pos x="connsiteX1" y="connsiteY1"/>
+                </a:cxn>
+                <a:cxn ang="0">
+                  <a:pos x="connsiteX2" y="connsiteY2"/>
+                </a:cxn>
+                <a:cxn ang="0">
+                  <a:pos x="connsiteX3" y="connsiteY3"/>
+                </a:cxn>
+                <a:cxn ang="0">
+                  <a:pos x="connsiteX4" y="connsiteY4"/>
+                </a:cxn>
+                <a:cxn ang="0">
+                  <a:pos x="connsiteX5" y="connsiteY5"/>
+                </a:cxn>
+                <a:cxn ang="0">
+                  <a:pos x="connsiteX6" y="connsiteY6"/>
+                </a:cxn>
+                <a:cxn ang="0">
+                  <a:pos x="connsiteX7" y="connsiteY7"/>
+                </a:cxn>
+                <a:cxn ang="0">
+                  <a:pos x="connsiteX8" y="connsiteY8"/>
+                </a:cxn>
+                <a:cxn ang="0">
+                  <a:pos x="connsiteX9" y="connsiteY9"/>
+                </a:cxn>
+                <a:cxn ang="0">
+                  <a:pos x="connsiteX10" y="connsiteY10"/>
+                </a:cxn>
+                <a:cxn ang="0">
+                  <a:pos x="connsiteX11" y="connsiteY11"/>
+                </a:cxn>
+                <a:cxn ang="0">
+                  <a:pos x="connsiteX12" y="connsiteY12"/>
+                </a:cxn>
+                <a:cxn ang="0">
+                  <a:pos x="connsiteX13" y="connsiteY13"/>
+                </a:cxn>
+                <a:cxn ang="0">
+                  <a:pos x="connsiteX14" y="connsiteY14"/>
+                </a:cxn>
+                <a:cxn ang="0">
+                  <a:pos x="connsiteX15" y="connsiteY15"/>
+                </a:cxn>
+              </a:cxnLst>
+              <a:rect l="l" t="t" r="r" b="b"/>
+              <a:pathLst>
+                <a:path w="838200" h="1295400">
+                  <a:moveTo>
+                    <a:pt x="543306" y="524066"/>
+                  </a:moveTo>
+                  <a:lnTo>
+                    <a:pt x="457010" y="496538"/>
+                  </a:lnTo>
+                  <a:cubicBezTo>
+                    <a:pt x="405479" y="480346"/>
+                    <a:pt x="322993" y="453962"/>
+                    <a:pt x="322993" y="378524"/>
+                  </a:cubicBezTo>
+                  <a:cubicBezTo>
+                    <a:pt x="322993" y="327660"/>
+                    <a:pt x="358997" y="287274"/>
+                    <a:pt x="450056" y="276511"/>
+                  </a:cubicBezTo>
+                  <a:cubicBezTo>
+                    <a:pt x="509107" y="272851"/>
+                    <a:pt x="568151" y="283777"/>
+                    <a:pt x="621982" y="308324"/>
+                  </a:cubicBezTo>
+                  <a:lnTo>
+                    <a:pt x="774383" y="90869"/>
+                  </a:lnTo>
+                  <a:cubicBezTo>
+                    <a:pt x="771049" y="88773"/>
+                    <a:pt x="651701" y="7144"/>
+                    <a:pt x="441008" y="7144"/>
+                  </a:cubicBezTo>
+                  <a:cubicBezTo>
+                    <a:pt x="169545" y="7144"/>
+                    <a:pt x="26289" y="213836"/>
+                    <a:pt x="26289" y="389001"/>
+                  </a:cubicBezTo>
+                  <a:cubicBezTo>
+                    <a:pt x="26289" y="552926"/>
+                    <a:pt x="109061" y="685800"/>
+                    <a:pt x="303276" y="751523"/>
+                  </a:cubicBezTo>
+                  <a:cubicBezTo>
+                    <a:pt x="450152" y="801243"/>
+                    <a:pt x="510635" y="843153"/>
+                    <a:pt x="510635" y="906018"/>
+                  </a:cubicBezTo>
+                  <a:cubicBezTo>
+                    <a:pt x="510635" y="950024"/>
+                    <a:pt x="482060" y="984313"/>
+                    <a:pt x="423101" y="1003840"/>
+                  </a:cubicBezTo>
+                  <a:cubicBezTo>
+                    <a:pt x="322707" y="1027652"/>
+                    <a:pt x="223076" y="985838"/>
+                    <a:pt x="169069" y="961168"/>
+                  </a:cubicBezTo>
+                  <a:lnTo>
+                    <a:pt x="7144" y="1191673"/>
+                  </a:lnTo>
+                  <a:cubicBezTo>
+                    <a:pt x="16002" y="1199007"/>
+                    <a:pt x="140018" y="1281208"/>
+                    <a:pt x="325279" y="1294924"/>
+                  </a:cubicBezTo>
+                  <a:cubicBezTo>
+                    <a:pt x="562833" y="1312450"/>
+                    <a:pt x="838676" y="1204722"/>
+                    <a:pt x="838676" y="894874"/>
+                  </a:cubicBezTo>
+                  <a:cubicBezTo>
+                    <a:pt x="838962" y="743522"/>
+                    <a:pt x="746379" y="588645"/>
+                    <a:pt x="543306" y="524066"/>
+                  </a:cubicBezTo>
+                  <a:close/>
+                </a:path>
+              </a:pathLst>
+            </a:custGeom>
+            <a:solidFill>
+              <a:schemeClr val="tx1"/>
+            </a:solidFill>
+            <a:ln w="9525" cap="flat">
+              <a:noFill/>
+              <a:prstDash val="solid"/>
+              <a:miter/>
+            </a:ln>
+          </p:spPr>
+          <p:txBody>
+            <a:bodyPr rtlCol="0" anchor="ctr"/>
+            <a:lstStyle/>
+            <a:p>
+              <a:endParaRPr lang="en-US"/>
+            </a:p>
+          </p:txBody>
+        </p:sp>
+        <p:sp>
+          <p:nvSpPr>
+            <p:cNvPr id="23" name="Freeform: Shape 22">
+              <a:extLst>
+                <a:ext uri="{FF2B5EF4-FFF2-40B4-BE49-F238E27FC236}">
+                  <a16:creationId xmlns:a16="http://schemas.microsoft.com/office/drawing/2014/main" id="{8847EC27-9795-4B8F-8EC7-320282550668}"/>
+                </a:ext>
+              </a:extLst>
+            </p:cNvPr>
+            <p:cNvSpPr/>
+            <p:nvPr/>
+          </p:nvSpPr>
+          <p:spPr>
+            <a:xfrm>
+              <a:off x="3820541" y="2683111"/>
+              <a:ext cx="1019175" cy="1295400"/>
+            </a:xfrm>
+            <a:custGeom>
+              <a:avLst/>
+              <a:gdLst>
+                <a:gd name="connsiteX0" fmla="*/ 846868 w 1019175"/>
+                <a:gd name="connsiteY0" fmla="*/ 947738 h 1295400"/>
+                <a:gd name="connsiteX1" fmla="*/ 666369 w 1019175"/>
+                <a:gd name="connsiteY1" fmla="*/ 987553 h 1295400"/>
+                <a:gd name="connsiteX2" fmla="*/ 348043 w 1019175"/>
+                <a:gd name="connsiteY2" fmla="*/ 640176 h 1295400"/>
+                <a:gd name="connsiteX3" fmla="*/ 643890 w 1019175"/>
+                <a:gd name="connsiteY3" fmla="*/ 308992 h 1295400"/>
+                <a:gd name="connsiteX4" fmla="*/ 814578 w 1019175"/>
+                <a:gd name="connsiteY4" fmla="*/ 347092 h 1295400"/>
+                <a:gd name="connsiteX5" fmla="*/ 990028 w 1019175"/>
+                <a:gd name="connsiteY5" fmla="*/ 96584 h 1295400"/>
+                <a:gd name="connsiteX6" fmla="*/ 637603 w 1019175"/>
+                <a:gd name="connsiteY6" fmla="*/ 7144 h 1295400"/>
+                <a:gd name="connsiteX7" fmla="*/ 7144 w 1019175"/>
+                <a:gd name="connsiteY7" fmla="*/ 653035 h 1295400"/>
+                <a:gd name="connsiteX8" fmla="*/ 653510 w 1019175"/>
+                <a:gd name="connsiteY8" fmla="*/ 1293019 h 1295400"/>
+                <a:gd name="connsiteX9" fmla="*/ 1013651 w 1019175"/>
+                <a:gd name="connsiteY9" fmla="*/ 1186911 h 1295400"/>
+                <a:gd name="connsiteX10" fmla="*/ 1013174 w 1019175"/>
+                <a:gd name="connsiteY10" fmla="*/ 1185292 h 1295400"/>
+              </a:gdLst>
+              <a:ahLst/>
+              <a:cxnLst>
+                <a:cxn ang="0">
+                  <a:pos x="connsiteX0" y="connsiteY0"/>
+                </a:cxn>
+                <a:cxn ang="0">
+                  <a:pos x="connsiteX1" y="connsiteY1"/>
+                </a:cxn>
+                <a:cxn ang="0">
+                  <a:pos x="connsiteX2" y="connsiteY2"/>
+                </a:cxn>
+                <a:cxn ang="0">
+                  <a:pos x="connsiteX3" y="connsiteY3"/>
+                </a:cxn>
+                <a:cxn ang="0">
+                  <a:pos x="connsiteX4" y="connsiteY4"/>
+                </a:cxn>
+                <a:cxn ang="0">
+                  <a:pos x="connsiteX5" y="connsiteY5"/>
+                </a:cxn>
+                <a:cxn ang="0">
+                  <a:pos x="connsiteX6" y="connsiteY6"/>
+                </a:cxn>
+                <a:cxn ang="0">
+                  <a:pos x="connsiteX7" y="connsiteY7"/>
+                </a:cxn>
+                <a:cxn ang="0">
+                  <a:pos x="connsiteX8" y="connsiteY8"/>
+                </a:cxn>
+                <a:cxn ang="0">
+                  <a:pos x="connsiteX9" y="connsiteY9"/>
+                </a:cxn>
+                <a:cxn ang="0">
+                  <a:pos x="connsiteX10" y="connsiteY10"/>
+                </a:cxn>
+              </a:cxnLst>
+              <a:rect l="l" t="t" r="r" b="b"/>
+              <a:pathLst>
+                <a:path w="1019175" h="1295400">
+                  <a:moveTo>
+                    <a:pt x="846868" y="947738"/>
+                  </a:moveTo>
+                  <a:cubicBezTo>
+                    <a:pt x="792671" y="982981"/>
+                    <a:pt x="728091" y="987553"/>
+                    <a:pt x="666369" y="987553"/>
+                  </a:cubicBezTo>
+                  <a:cubicBezTo>
+                    <a:pt x="486251" y="987553"/>
+                    <a:pt x="348043" y="839534"/>
+                    <a:pt x="348043" y="640176"/>
+                  </a:cubicBezTo>
+                  <a:cubicBezTo>
+                    <a:pt x="348043" y="450438"/>
+                    <a:pt x="473392" y="308992"/>
+                    <a:pt x="643890" y="308992"/>
+                  </a:cubicBezTo>
+                  <a:cubicBezTo>
+                    <a:pt x="698182" y="308992"/>
+                    <a:pt x="758190" y="312325"/>
+                    <a:pt x="814578" y="347092"/>
+                  </a:cubicBezTo>
+                  <a:lnTo>
+                    <a:pt x="990028" y="96584"/>
+                  </a:lnTo>
+                  <a:cubicBezTo>
+                    <a:pt x="881788" y="38008"/>
+                    <a:pt x="760678" y="7272"/>
+                    <a:pt x="637603" y="7144"/>
+                  </a:cubicBezTo>
+                  <a:cubicBezTo>
+                    <a:pt x="280511" y="6668"/>
+                    <a:pt x="7144" y="286417"/>
+                    <a:pt x="7144" y="653035"/>
+                  </a:cubicBezTo>
+                  <a:cubicBezTo>
+                    <a:pt x="7144" y="1022890"/>
+                    <a:pt x="277273" y="1293019"/>
+                    <a:pt x="653510" y="1293019"/>
+                  </a:cubicBezTo>
+                  <a:cubicBezTo>
+                    <a:pt x="798195" y="1293019"/>
+                    <a:pt x="926878" y="1254919"/>
+                    <a:pt x="1013651" y="1186911"/>
+                  </a:cubicBezTo>
+                  <a:lnTo>
+                    <a:pt x="1013174" y="1185292"/>
+                  </a:lnTo>
+                  <a:close/>
+                </a:path>
+              </a:pathLst>
+            </a:custGeom>
+            <a:solidFill>
+              <a:schemeClr val="tx1"/>
+            </a:solidFill>
+            <a:ln w="9525" cap="flat">
+              <a:noFill/>
+              <a:prstDash val="solid"/>
+              <a:miter/>
+            </a:ln>
+          </p:spPr>
+          <p:txBody>
+            <a:bodyPr rtlCol="0" anchor="ctr"/>
+            <a:lstStyle/>
+            <a:p>
+              <a:endParaRPr lang="en-US"/>
+            </a:p>
+          </p:txBody>
+        </p:sp>
+      </p:grpSp>
+    </p:spTree>
+    <p:extLst>
+      <p:ext uri="{BB962C8B-B14F-4D97-AF65-F5344CB8AC3E}">
+        <p14:creationId xmlns:p14="http://schemas.microsoft.com/office/powerpoint/2010/main" val="3071560315"/>
+      </p:ext>
+    </p:extLst>
+  </p:cSld>
+  <p:clrMapOvr>
+    <a:masterClrMapping/>
+  </p:clrMapOvr>
+  <p:transition/>
 </p:sldLayout>
 </file>
 
@@ -873,7 +2079,7 @@
           <a:p>
             <a:fld id="{CF1267A5-9448-410E-9905-2BFAF5898020}" type="datetimeFigureOut">
               <a:rPr lang="en-SG" smtClean="0"/>
-              <a:t>19/11/2021</a:t>
+              <a:t>25/11/2021</a:t>
             </a:fld>
             <a:endParaRPr lang="en-SG"/>
           </a:p>
@@ -1149,7 +2355,7 @@
           <a:p>
             <a:fld id="{CF1267A5-9448-410E-9905-2BFAF5898020}" type="datetimeFigureOut">
               <a:rPr lang="en-SG" smtClean="0"/>
-              <a:t>19/11/2021</a:t>
+              <a:t>25/11/2021</a:t>
             </a:fld>
             <a:endParaRPr lang="en-SG"/>
           </a:p>
@@ -1417,7 +2623,7 @@
           <a:p>
             <a:fld id="{CF1267A5-9448-410E-9905-2BFAF5898020}" type="datetimeFigureOut">
               <a:rPr lang="en-SG" smtClean="0"/>
-              <a:t>19/11/2021</a:t>
+              <a:t>25/11/2021</a:t>
             </a:fld>
             <a:endParaRPr lang="en-SG"/>
           </a:p>
@@ -1832,7 +3038,7 @@
           <a:p>
             <a:fld id="{CF1267A5-9448-410E-9905-2BFAF5898020}" type="datetimeFigureOut">
               <a:rPr lang="en-SG" smtClean="0"/>
-              <a:t>19/11/2021</a:t>
+              <a:t>25/11/2021</a:t>
             </a:fld>
             <a:endParaRPr lang="en-SG"/>
           </a:p>
@@ -1974,7 +3180,7 @@
           <a:p>
             <a:fld id="{CF1267A5-9448-410E-9905-2BFAF5898020}" type="datetimeFigureOut">
               <a:rPr lang="en-SG" smtClean="0"/>
-              <a:t>19/11/2021</a:t>
+              <a:t>25/11/2021</a:t>
             </a:fld>
             <a:endParaRPr lang="en-SG"/>
           </a:p>
@@ -2087,7 +3293,7 @@
           <a:p>
             <a:fld id="{CF1267A5-9448-410E-9905-2BFAF5898020}" type="datetimeFigureOut">
               <a:rPr lang="en-SG" smtClean="0"/>
-              <a:t>19/11/2021</a:t>
+              <a:t>25/11/2021</a:t>
             </a:fld>
             <a:endParaRPr lang="en-SG"/>
           </a:p>
@@ -2400,7 +3606,7 @@
           <a:p>
             <a:fld id="{CF1267A5-9448-410E-9905-2BFAF5898020}" type="datetimeFigureOut">
               <a:rPr lang="en-SG" smtClean="0"/>
-              <a:t>19/11/2021</a:t>
+              <a:t>25/11/2021</a:t>
             </a:fld>
             <a:endParaRPr lang="en-SG"/>
           </a:p>
@@ -2689,7 +3895,7 @@
           <a:p>
             <a:fld id="{CF1267A5-9448-410E-9905-2BFAF5898020}" type="datetimeFigureOut">
               <a:rPr lang="en-SG" smtClean="0"/>
-              <a:t>19/11/2021</a:t>
+              <a:t>25/11/2021</a:t>
             </a:fld>
             <a:endParaRPr lang="en-SG"/>
           </a:p>
@@ -2932,7 +4138,7 @@
           <a:p>
             <a:fld id="{CF1267A5-9448-410E-9905-2BFAF5898020}" type="datetimeFigureOut">
               <a:rPr lang="en-SG" smtClean="0"/>
-              <a:t>19/11/2021</a:t>
+              <a:t>25/11/2021</a:t>
             </a:fld>
             <a:endParaRPr lang="en-SG"/>
           </a:p>
@@ -3048,6 +4254,7 @@
     <p:sldLayoutId id="2147483657" r:id="rId9"/>
     <p:sldLayoutId id="2147483658" r:id="rId10"/>
     <p:sldLayoutId id="2147483659" r:id="rId11"/>
+    <p:sldLayoutId id="2147483660" r:id="rId12"/>
   </p:sldLayoutIdLst>
   <p:txStyles>
     <p:titleStyle>
@@ -5993,6 +7200,377 @@
 </p:sld>
 </file>
 
+<file path=ppt/slides/slide4.xml><?xml version="1.0" encoding="utf-8"?>
+<p:sld xmlns:a="http://schemas.openxmlformats.org/drawingml/2006/main" xmlns:r="http://schemas.openxmlformats.org/officeDocument/2006/relationships" xmlns:p="http://schemas.openxmlformats.org/presentationml/2006/main">
+  <p:cSld>
+    <p:spTree>
+      <p:nvGrpSpPr>
+        <p:cNvPr id="1" name=""/>
+        <p:cNvGrpSpPr/>
+        <p:nvPr/>
+      </p:nvGrpSpPr>
+      <p:grpSpPr>
+        <a:xfrm>
+          <a:off x="0" y="0"/>
+          <a:ext cx="0" cy="0"/>
+          <a:chOff x="0" y="0"/>
+          <a:chExt cx="0" cy="0"/>
+        </a:xfrm>
+      </p:grpSpPr>
+      <p:sp>
+        <p:nvSpPr>
+          <p:cNvPr id="2" name="Title 1">
+            <a:extLst>
+              <a:ext uri="{FF2B5EF4-FFF2-40B4-BE49-F238E27FC236}">
+                <a16:creationId xmlns:a16="http://schemas.microsoft.com/office/drawing/2014/main" id="{221A4FF2-258D-5B43-9F67-E984C9974D8C}"/>
+              </a:ext>
+            </a:extLst>
+          </p:cNvPr>
+          <p:cNvSpPr>
+            <a:spLocks noGrp="1"/>
+          </p:cNvSpPr>
+          <p:nvPr>
+            <p:ph type="title"/>
+          </p:nvPr>
+        </p:nvSpPr>
+        <p:spPr>
+          <a:xfrm>
+            <a:off x="601883" y="365126"/>
+            <a:ext cx="10995949" cy="803918"/>
+          </a:xfrm>
+        </p:spPr>
+        <p:txBody>
+          <a:bodyPr/>
+          <a:lstStyle/>
+          <a:p>
+            <a:r>
+              <a:rPr lang="en-GB"/>
+              <a:t>three column icons</a:t>
+            </a:r>
+            <a:endParaRPr lang="en-US"/>
+          </a:p>
+        </p:txBody>
+      </p:sp>
+      <p:sp>
+        <p:nvSpPr>
+          <p:cNvPr id="3" name="Text Placeholder 2">
+            <a:extLst>
+              <a:ext uri="{FF2B5EF4-FFF2-40B4-BE49-F238E27FC236}">
+                <a16:creationId xmlns:a16="http://schemas.microsoft.com/office/drawing/2014/main" id="{5747BB81-B37F-1046-B23A-6BC056F0EA14}"/>
+              </a:ext>
+            </a:extLst>
+          </p:cNvPr>
+          <p:cNvSpPr>
+            <a:spLocks noGrp="1"/>
+          </p:cNvSpPr>
+          <p:nvPr>
+            <p:ph type="body" sz="quarter" idx="10"/>
+          </p:nvPr>
+        </p:nvSpPr>
+        <p:spPr>
+          <a:xfrm>
+            <a:off x="601663" y="3678865"/>
+            <a:ext cx="3533775" cy="1834523"/>
+          </a:xfrm>
+        </p:spPr>
+        <p:txBody>
+          <a:bodyPr/>
+          <a:lstStyle/>
+          <a:p>
+            <a:r>
+              <a:rPr lang="en-SG" err="1"/>
+              <a:t>Etiam sollicitudin dui ut elit lacinia, vitae aliquet nunc scelerisque. Duis ut sem bibendum, vehicula ligula non, varius eros. Duis tristique velit lectus, dapibus ullamcorper dui condimentum id.</a:t>
+            </a:r>
+            <a:endParaRPr lang="en-US"/>
+          </a:p>
+        </p:txBody>
+      </p:sp>
+      <p:sp>
+        <p:nvSpPr>
+          <p:cNvPr id="4" name="Text Placeholder 3">
+            <a:extLst>
+              <a:ext uri="{FF2B5EF4-FFF2-40B4-BE49-F238E27FC236}">
+                <a16:creationId xmlns:a16="http://schemas.microsoft.com/office/drawing/2014/main" id="{4F88F636-7961-5A47-9F45-B8BAFD583020}"/>
+              </a:ext>
+            </a:extLst>
+          </p:cNvPr>
+          <p:cNvSpPr>
+            <a:spLocks noGrp="1"/>
+          </p:cNvSpPr>
+          <p:nvPr>
+            <p:ph type="body" sz="quarter" idx="11"/>
+          </p:nvPr>
+        </p:nvSpPr>
+        <p:spPr>
+          <a:xfrm>
+            <a:off x="4325938" y="3678865"/>
+            <a:ext cx="3532187" cy="1834523"/>
+          </a:xfrm>
+        </p:spPr>
+        <p:txBody>
+          <a:bodyPr/>
+          <a:lstStyle/>
+          <a:p>
+            <a:r>
+              <a:rPr lang="en-SG" err="1"/>
+              <a:t>Etiam sollicitudin dui ut elit lacinia, vitae aliquet nunc scelerisque. Duis ut sem bibendum, vehicula ligula non, varius eros. Duis tristique velit lectus, dapibus ullamcorper dui condimentum id.</a:t>
+            </a:r>
+            <a:endParaRPr lang="en-US"/>
+          </a:p>
+        </p:txBody>
+      </p:sp>
+      <p:sp>
+        <p:nvSpPr>
+          <p:cNvPr id="5" name="Text Placeholder 4">
+            <a:extLst>
+              <a:ext uri="{FF2B5EF4-FFF2-40B4-BE49-F238E27FC236}">
+                <a16:creationId xmlns:a16="http://schemas.microsoft.com/office/drawing/2014/main" id="{4A991408-69A8-E447-A7EE-B4F085732EE6}"/>
+              </a:ext>
+            </a:extLst>
+          </p:cNvPr>
+          <p:cNvSpPr>
+            <a:spLocks noGrp="1"/>
+          </p:cNvSpPr>
+          <p:nvPr>
+            <p:ph type="body" sz="quarter" idx="12"/>
+          </p:nvPr>
+        </p:nvSpPr>
+        <p:spPr>
+          <a:xfrm>
+            <a:off x="8048625" y="3678865"/>
+            <a:ext cx="3533775" cy="1834523"/>
+          </a:xfrm>
+        </p:spPr>
+        <p:txBody>
+          <a:bodyPr/>
+          <a:lstStyle/>
+          <a:p>
+            <a:r>
+              <a:rPr lang="en-SG" dirty="0" err="1"/>
+              <a:t>Etiam</a:t>
+            </a:r>
+            <a:r>
+              <a:rPr lang="en-SG" dirty="0"/>
+              <a:t> </a:t>
+            </a:r>
+            <a:r>
+              <a:rPr lang="en-SG" dirty="0" err="1"/>
+              <a:t>sollicitudin</a:t>
+            </a:r>
+            <a:r>
+              <a:rPr lang="en-SG" dirty="0"/>
+              <a:t> dui </a:t>
+            </a:r>
+            <a:r>
+              <a:rPr lang="en-SG" dirty="0" err="1"/>
+              <a:t>ut</a:t>
+            </a:r>
+            <a:r>
+              <a:rPr lang="en-SG" dirty="0"/>
+              <a:t> </a:t>
+            </a:r>
+            <a:r>
+              <a:rPr lang="en-SG" dirty="0" err="1"/>
+              <a:t>elit</a:t>
+            </a:r>
+            <a:r>
+              <a:rPr lang="en-SG" dirty="0"/>
+              <a:t> lacinia, vitae </a:t>
+            </a:r>
+            <a:r>
+              <a:rPr lang="en-SG" dirty="0" err="1"/>
+              <a:t>aliquet</a:t>
+            </a:r>
+            <a:r>
+              <a:rPr lang="en-SG" dirty="0"/>
+              <a:t> </a:t>
+            </a:r>
+            <a:r>
+              <a:rPr lang="en-SG" dirty="0" err="1"/>
+              <a:t>nunc</a:t>
+            </a:r>
+            <a:r>
+              <a:rPr lang="en-SG" dirty="0"/>
+              <a:t> </a:t>
+            </a:r>
+            <a:r>
+              <a:rPr lang="en-SG" dirty="0" err="1"/>
+              <a:t>scelerisque</a:t>
+            </a:r>
+            <a:r>
+              <a:rPr lang="en-SG" dirty="0"/>
+              <a:t>. Duis </a:t>
+            </a:r>
+            <a:r>
+              <a:rPr lang="en-SG" dirty="0" err="1"/>
+              <a:t>ut</a:t>
+            </a:r>
+            <a:r>
+              <a:rPr lang="en-SG" dirty="0"/>
+              <a:t> </a:t>
+            </a:r>
+            <a:r>
+              <a:rPr lang="en-SG" dirty="0" err="1"/>
+              <a:t>sem</a:t>
+            </a:r>
+            <a:r>
+              <a:rPr lang="en-SG" dirty="0"/>
+              <a:t> </a:t>
+            </a:r>
+            <a:r>
+              <a:rPr lang="en-SG" dirty="0" err="1"/>
+              <a:t>bibendum</a:t>
+            </a:r>
+            <a:r>
+              <a:rPr lang="en-SG" dirty="0"/>
+              <a:t>, </a:t>
+            </a:r>
+            <a:r>
+              <a:rPr lang="en-SG" dirty="0" err="1"/>
+              <a:t>vehicula</a:t>
+            </a:r>
+            <a:r>
+              <a:rPr lang="en-SG" dirty="0"/>
+              <a:t> ligula non, </a:t>
+            </a:r>
+            <a:r>
+              <a:rPr lang="en-SG" dirty="0" err="1"/>
+              <a:t>varius</a:t>
+            </a:r>
+            <a:r>
+              <a:rPr lang="en-SG" dirty="0"/>
+              <a:t> eros. Duis </a:t>
+            </a:r>
+            <a:r>
+              <a:rPr lang="en-SG" dirty="0" err="1"/>
+              <a:t>tristique</a:t>
+            </a:r>
+            <a:r>
+              <a:rPr lang="en-SG" dirty="0"/>
+              <a:t> </a:t>
+            </a:r>
+            <a:r>
+              <a:rPr lang="en-SG" dirty="0" err="1"/>
+              <a:t>velit</a:t>
+            </a:r>
+            <a:r>
+              <a:rPr lang="en-SG" dirty="0"/>
+              <a:t> </a:t>
+            </a:r>
+            <a:r>
+              <a:rPr lang="en-SG" dirty="0" err="1"/>
+              <a:t>lectus</a:t>
+            </a:r>
+            <a:r>
+              <a:rPr lang="en-SG" dirty="0"/>
+              <a:t>, </a:t>
+            </a:r>
+            <a:r>
+              <a:rPr lang="en-SG" dirty="0" err="1"/>
+              <a:t>dapibus</a:t>
+            </a:r>
+            <a:r>
+              <a:rPr lang="en-SG" dirty="0"/>
+              <a:t> </a:t>
+            </a:r>
+            <a:r>
+              <a:rPr lang="en-SG" dirty="0" err="1"/>
+              <a:t>ullamcorper</a:t>
+            </a:r>
+            <a:r>
+              <a:rPr lang="en-SG" dirty="0"/>
+              <a:t> dui </a:t>
+            </a:r>
+            <a:r>
+              <a:rPr lang="en-SG" dirty="0" err="1"/>
+              <a:t>condimentum</a:t>
+            </a:r>
+            <a:r>
+              <a:rPr lang="en-SG" dirty="0"/>
+              <a:t> id.</a:t>
+            </a:r>
+            <a:endParaRPr lang="en-US" dirty="0"/>
+          </a:p>
+        </p:txBody>
+      </p:sp>
+      <p:cxnSp>
+        <p:nvCxnSpPr>
+          <p:cNvPr id="7" name="Google Shape;65;p14">
+            <a:extLst>
+              <a:ext uri="{FF2B5EF4-FFF2-40B4-BE49-F238E27FC236}">
+                <a16:creationId xmlns:a16="http://schemas.microsoft.com/office/drawing/2014/main" id="{EB6FCEC6-CC41-CD4F-8420-5F77A4BE4BEA}"/>
+              </a:ext>
+            </a:extLst>
+          </p:cNvPr>
+          <p:cNvCxnSpPr/>
+          <p:nvPr/>
+        </p:nvCxnSpPr>
+        <p:spPr>
+          <a:xfrm flipH="1" flipV="1">
+            <a:off x="4226169" y="2169042"/>
+            <a:ext cx="0" cy="2771232"/>
+          </a:xfrm>
+          <a:prstGeom prst="straightConnector1">
+            <a:avLst/>
+          </a:prstGeom>
+          <a:noFill/>
+          <a:ln w="9525" cap="flat" cmpd="sng">
+            <a:solidFill>
+              <a:srgbClr val="00A7E1"/>
+            </a:solidFill>
+            <a:prstDash val="solid"/>
+            <a:round/>
+            <a:headEnd type="none" w="med" len="med"/>
+            <a:tailEnd type="none" w="med" len="med"/>
+          </a:ln>
+        </p:spPr>
+      </p:cxnSp>
+      <p:cxnSp>
+        <p:nvCxnSpPr>
+          <p:cNvPr id="9" name="Google Shape;65;p14">
+            <a:extLst>
+              <a:ext uri="{FF2B5EF4-FFF2-40B4-BE49-F238E27FC236}">
+                <a16:creationId xmlns:a16="http://schemas.microsoft.com/office/drawing/2014/main" id="{101EB83B-2697-3845-881D-87E1FBCCFC31}"/>
+              </a:ext>
+            </a:extLst>
+          </p:cNvPr>
+          <p:cNvCxnSpPr/>
+          <p:nvPr/>
+        </p:nvCxnSpPr>
+        <p:spPr>
+          <a:xfrm flipH="1" flipV="1">
+            <a:off x="7957396" y="2169042"/>
+            <a:ext cx="0" cy="2771232"/>
+          </a:xfrm>
+          <a:prstGeom prst="straightConnector1">
+            <a:avLst/>
+          </a:prstGeom>
+          <a:noFill/>
+          <a:ln w="9525" cap="flat" cmpd="sng">
+            <a:solidFill>
+              <a:srgbClr val="00A7E1"/>
+            </a:solidFill>
+            <a:prstDash val="solid"/>
+            <a:round/>
+            <a:headEnd type="none" w="med" len="med"/>
+            <a:tailEnd type="none" w="med" len="med"/>
+          </a:ln>
+        </p:spPr>
+      </p:cxnSp>
+    </p:spTree>
+    <p:extLst>
+      <p:ext uri="{BB962C8B-B14F-4D97-AF65-F5344CB8AC3E}">
+        <p14:creationId xmlns:p14="http://schemas.microsoft.com/office/powerpoint/2010/main" val="625592978"/>
+      </p:ext>
+    </p:extLst>
+  </p:cSld>
+  <p:clrMapOvr>
+    <a:masterClrMapping/>
+  </p:clrMapOvr>
+  <p:transition/>
+</p:sld>
+</file>
+
 <file path=ppt/theme/theme1.xml><?xml version="1.0" encoding="utf-8"?>
 <a:theme xmlns:a="http://schemas.openxmlformats.org/drawingml/2006/main" name="Office Theme">
   <a:themeElements>

</xml_diff>

<commit_message>
Update the certificate download function.
</commit_message>
<xml_diff>
--- a/doc/progress.pptx
+++ b/doc/progress.pptx
@@ -270,7 +270,7 @@
           <a:p>
             <a:fld id="{CF1267A5-9448-410E-9905-2BFAF5898020}" type="datetimeFigureOut">
               <a:rPr lang="en-SG" smtClean="0"/>
-              <a:t>25/11/2021</a:t>
+              <a:t>4/1/2022</a:t>
             </a:fld>
             <a:endParaRPr lang="en-SG"/>
           </a:p>
@@ -470,7 +470,7 @@
           <a:p>
             <a:fld id="{CF1267A5-9448-410E-9905-2BFAF5898020}" type="datetimeFigureOut">
               <a:rPr lang="en-SG" smtClean="0"/>
-              <a:t>25/11/2021</a:t>
+              <a:t>4/1/2022</a:t>
             </a:fld>
             <a:endParaRPr lang="en-SG"/>
           </a:p>
@@ -680,7 +680,7 @@
           <a:p>
             <a:fld id="{CF1267A5-9448-410E-9905-2BFAF5898020}" type="datetimeFigureOut">
               <a:rPr lang="en-SG" smtClean="0"/>
-              <a:t>25/11/2021</a:t>
+              <a:t>4/1/2022</a:t>
             </a:fld>
             <a:endParaRPr lang="en-SG"/>
           </a:p>
@@ -2085,7 +2085,7 @@
           <a:p>
             <a:fld id="{CF1267A5-9448-410E-9905-2BFAF5898020}" type="datetimeFigureOut">
               <a:rPr lang="en-SG" smtClean="0"/>
-              <a:t>25/11/2021</a:t>
+              <a:t>4/1/2022</a:t>
             </a:fld>
             <a:endParaRPr lang="en-SG"/>
           </a:p>
@@ -2361,7 +2361,7 @@
           <a:p>
             <a:fld id="{CF1267A5-9448-410E-9905-2BFAF5898020}" type="datetimeFigureOut">
               <a:rPr lang="en-SG" smtClean="0"/>
-              <a:t>25/11/2021</a:t>
+              <a:t>4/1/2022</a:t>
             </a:fld>
             <a:endParaRPr lang="en-SG"/>
           </a:p>
@@ -2629,7 +2629,7 @@
           <a:p>
             <a:fld id="{CF1267A5-9448-410E-9905-2BFAF5898020}" type="datetimeFigureOut">
               <a:rPr lang="en-SG" smtClean="0"/>
-              <a:t>25/11/2021</a:t>
+              <a:t>4/1/2022</a:t>
             </a:fld>
             <a:endParaRPr lang="en-SG"/>
           </a:p>
@@ -3044,7 +3044,7 @@
           <a:p>
             <a:fld id="{CF1267A5-9448-410E-9905-2BFAF5898020}" type="datetimeFigureOut">
               <a:rPr lang="en-SG" smtClean="0"/>
-              <a:t>25/11/2021</a:t>
+              <a:t>4/1/2022</a:t>
             </a:fld>
             <a:endParaRPr lang="en-SG"/>
           </a:p>
@@ -3186,7 +3186,7 @@
           <a:p>
             <a:fld id="{CF1267A5-9448-410E-9905-2BFAF5898020}" type="datetimeFigureOut">
               <a:rPr lang="en-SG" smtClean="0"/>
-              <a:t>25/11/2021</a:t>
+              <a:t>4/1/2022</a:t>
             </a:fld>
             <a:endParaRPr lang="en-SG"/>
           </a:p>
@@ -3299,7 +3299,7 @@
           <a:p>
             <a:fld id="{CF1267A5-9448-410E-9905-2BFAF5898020}" type="datetimeFigureOut">
               <a:rPr lang="en-SG" smtClean="0"/>
-              <a:t>25/11/2021</a:t>
+              <a:t>4/1/2022</a:t>
             </a:fld>
             <a:endParaRPr lang="en-SG"/>
           </a:p>
@@ -3612,7 +3612,7 @@
           <a:p>
             <a:fld id="{CF1267A5-9448-410E-9905-2BFAF5898020}" type="datetimeFigureOut">
               <a:rPr lang="en-SG" smtClean="0"/>
-              <a:t>25/11/2021</a:t>
+              <a:t>4/1/2022</a:t>
             </a:fld>
             <a:endParaRPr lang="en-SG"/>
           </a:p>
@@ -3901,7 +3901,7 @@
           <a:p>
             <a:fld id="{CF1267A5-9448-410E-9905-2BFAF5898020}" type="datetimeFigureOut">
               <a:rPr lang="en-SG" smtClean="0"/>
-              <a:t>25/11/2021</a:t>
+              <a:t>4/1/2022</a:t>
             </a:fld>
             <a:endParaRPr lang="en-SG"/>
           </a:p>
@@ -4144,7 +4144,7 @@
           <a:p>
             <a:fld id="{CF1267A5-9448-410E-9905-2BFAF5898020}" type="datetimeFigureOut">
               <a:rPr lang="en-SG" smtClean="0"/>
-              <a:t>25/11/2021</a:t>
+              <a:t>4/1/2022</a:t>
             </a:fld>
             <a:endParaRPr lang="en-SG"/>
           </a:p>
@@ -5138,7 +5138,7 @@
         </p:nvCxnSpPr>
         <p:spPr>
           <a:xfrm>
-            <a:off x="824761" y="3959562"/>
+            <a:off x="788185" y="4006625"/>
             <a:ext cx="0" cy="615847"/>
           </a:xfrm>
           <a:prstGeom prst="straightConnector1">
@@ -5322,7 +5322,7 @@
         </p:nvCxnSpPr>
         <p:spPr>
           <a:xfrm>
-            <a:off x="1713142" y="3959562"/>
+            <a:off x="1538159" y="3989537"/>
             <a:ext cx="0" cy="615847"/>
           </a:xfrm>
           <a:prstGeom prst="straightConnector1">
@@ -5362,7 +5362,7 @@
         </p:nvSpPr>
         <p:spPr>
           <a:xfrm>
-            <a:off x="1345578" y="4677174"/>
+            <a:off x="1198047" y="4686609"/>
             <a:ext cx="680224" cy="433370"/>
           </a:xfrm>
           <a:prstGeom prst="roundRect">
@@ -5506,7 +5506,7 @@
         </p:nvCxnSpPr>
         <p:spPr>
           <a:xfrm>
-            <a:off x="2586652" y="3959562"/>
+            <a:off x="2303188" y="4006625"/>
             <a:ext cx="0" cy="615847"/>
           </a:xfrm>
           <a:prstGeom prst="straightConnector1">
@@ -5546,8 +5546,8 @@
         </p:nvSpPr>
         <p:spPr>
           <a:xfrm>
-            <a:off x="2219087" y="4677174"/>
-            <a:ext cx="869797" cy="433370"/>
+            <a:off x="1962611" y="4686609"/>
+            <a:ext cx="789734" cy="423935"/>
           </a:xfrm>
           <a:prstGeom prst="roundRect">
             <a:avLst/>
@@ -5925,7 +5925,7 @@
         <p:spPr>
           <a:xfrm>
             <a:off x="177552" y="4314549"/>
-            <a:ext cx="4518731" cy="1071468"/>
+            <a:ext cx="5018915" cy="1071468"/>
           </a:xfrm>
           <a:prstGeom prst="rect">
             <a:avLst/>
@@ -6027,7 +6027,7 @@
         <p:spPr>
           <a:xfrm>
             <a:off x="2846014" y="3959562"/>
-            <a:ext cx="873730" cy="717612"/>
+            <a:ext cx="1294072" cy="645822"/>
           </a:xfrm>
           <a:prstGeom prst="straightConnector1">
             <a:avLst/>
@@ -6054,10 +6054,10 @@
       </p:cxnSp>
       <p:sp>
         <p:nvSpPr>
-          <p:cNvPr id="31" name="矩形: 圆角 34">
-            <a:extLst>
-              <a:ext uri="{FF2B5EF4-FFF2-40B4-BE49-F238E27FC236}">
-                <a16:creationId xmlns:a16="http://schemas.microsoft.com/office/drawing/2014/main" id="{56584168-3CDF-4CDF-AE12-B9FD56010EAD}"/>
+          <p:cNvPr id="26" name="矩形: 圆角 34">
+            <a:extLst>
+              <a:ext uri="{FF2B5EF4-FFF2-40B4-BE49-F238E27FC236}">
+                <a16:creationId xmlns:a16="http://schemas.microsoft.com/office/drawing/2014/main" id="{B26D4105-4D5A-45B8-ACE8-24ED71C45DF6}"/>
               </a:ext>
             </a:extLst>
           </p:cNvPr>
@@ -6066,8 +6066,8 @@
         </p:nvSpPr>
         <p:spPr>
           <a:xfrm>
-            <a:off x="3373298" y="4690678"/>
-            <a:ext cx="1101048" cy="433370"/>
+            <a:off x="2858727" y="4681891"/>
+            <a:ext cx="918052" cy="423935"/>
           </a:xfrm>
           <a:prstGeom prst="roundRect">
             <a:avLst/>
@@ -6187,10 +6187,142 @@
           <a:p>
             <a:pPr algn="ctr"/>
             <a:r>
-              <a:rPr lang="en-SG" altLang="zh-CN" sz="1400" b="1" dirty="0"/>
-              <a:t>Main page </a:t>
-            </a:r>
-            <a:endParaRPr lang="zh-CN" altLang="en-US" sz="1400" b="1" dirty="0"/>
+              <a:rPr lang="en-US" altLang="zh-CN" sz="1600" b="1" dirty="0"/>
+              <a:t>SSL-CA</a:t>
+            </a:r>
+            <a:endParaRPr lang="zh-CN" altLang="en-US" sz="1600" b="1" dirty="0"/>
+          </a:p>
+        </p:txBody>
+      </p:sp>
+      <p:cxnSp>
+        <p:nvCxnSpPr>
+          <p:cNvPr id="30" name="直接箭头连接符 49">
+            <a:extLst>
+              <a:ext uri="{FF2B5EF4-FFF2-40B4-BE49-F238E27FC236}">
+                <a16:creationId xmlns:a16="http://schemas.microsoft.com/office/drawing/2014/main" id="{FBBDDD2F-6E08-4D42-85AB-54D0C4B207AC}"/>
+              </a:ext>
+            </a:extLst>
+          </p:cNvPr>
+          <p:cNvCxnSpPr>
+            <a:cxnSpLocks/>
+          </p:cNvCxnSpPr>
+          <p:nvPr/>
+        </p:nvCxnSpPr>
+        <p:spPr>
+          <a:xfrm>
+            <a:off x="2684189" y="4006625"/>
+            <a:ext cx="397339" cy="598759"/>
+          </a:xfrm>
+          <a:prstGeom prst="straightConnector1">
+            <a:avLst/>
+          </a:prstGeom>
+          <a:ln w="28575">
+            <a:prstDash val="dash"/>
+            <a:tailEnd type="triangle"/>
+          </a:ln>
+        </p:spPr>
+        <p:style>
+          <a:lnRef idx="1">
+            <a:schemeClr val="accent1"/>
+          </a:lnRef>
+          <a:fillRef idx="0">
+            <a:schemeClr val="accent1"/>
+          </a:fillRef>
+          <a:effectRef idx="0">
+            <a:schemeClr val="accent1"/>
+          </a:effectRef>
+          <a:fontRef idx="minor">
+            <a:schemeClr val="tx1"/>
+          </a:fontRef>
+        </p:style>
+      </p:cxnSp>
+      <p:sp>
+        <p:nvSpPr>
+          <p:cNvPr id="32" name="TextBox 31">
+            <a:extLst>
+              <a:ext uri="{FF2B5EF4-FFF2-40B4-BE49-F238E27FC236}">
+                <a16:creationId xmlns:a16="http://schemas.microsoft.com/office/drawing/2014/main" id="{EB8BDC8A-6588-414A-8759-9420AA77B4E8}"/>
+              </a:ext>
+            </a:extLst>
+          </p:cNvPr>
+          <p:cNvSpPr txBox="1"/>
+          <p:nvPr/>
+        </p:nvSpPr>
+        <p:spPr>
+          <a:xfrm>
+            <a:off x="3882368" y="4960371"/>
+            <a:ext cx="1165120" cy="246221"/>
+          </a:xfrm>
+          <a:prstGeom prst="rect">
+            <a:avLst/>
+          </a:prstGeom>
+          <a:solidFill>
+            <a:schemeClr val="bg1"/>
+          </a:solidFill>
+          <a:ln w="3175">
+            <a:solidFill>
+              <a:schemeClr val="tx1"/>
+            </a:solidFill>
+          </a:ln>
+        </p:spPr>
+        <p:txBody>
+          <a:bodyPr wrap="square" rtlCol="0">
+            <a:spAutoFit/>
+          </a:bodyPr>
+          <a:lstStyle/>
+          <a:p>
+            <a:r>
+              <a:rPr lang="en-US" sz="1000" b="1" dirty="0" err="1"/>
+              <a:t>url</a:t>
+            </a:r>
+            <a:r>
+              <a:rPr lang="en-US" sz="1000" b="1" dirty="0"/>
+              <a:t> record file (txt)</a:t>
+            </a:r>
+            <a:endParaRPr lang="en-SG" sz="1000" b="1" dirty="0"/>
+          </a:p>
+        </p:txBody>
+      </p:sp>
+      <p:sp>
+        <p:nvSpPr>
+          <p:cNvPr id="33" name="TextBox 32">
+            <a:extLst>
+              <a:ext uri="{FF2B5EF4-FFF2-40B4-BE49-F238E27FC236}">
+                <a16:creationId xmlns:a16="http://schemas.microsoft.com/office/drawing/2014/main" id="{3C8DEC04-6A99-462C-8882-F3A9EAEFC0D5}"/>
+              </a:ext>
+            </a:extLst>
+          </p:cNvPr>
+          <p:cNvSpPr txBox="1"/>
+          <p:nvPr/>
+        </p:nvSpPr>
+        <p:spPr>
+          <a:xfrm>
+            <a:off x="3882368" y="4638860"/>
+            <a:ext cx="1165120" cy="246221"/>
+          </a:xfrm>
+          <a:prstGeom prst="rect">
+            <a:avLst/>
+          </a:prstGeom>
+          <a:solidFill>
+            <a:schemeClr val="bg1"/>
+          </a:solidFill>
+          <a:ln w="3175">
+            <a:solidFill>
+              <a:schemeClr val="tx1"/>
+            </a:solidFill>
+          </a:ln>
+        </p:spPr>
+        <p:txBody>
+          <a:bodyPr wrap="square" rtlCol="0">
+            <a:spAutoFit/>
+          </a:bodyPr>
+          <a:lstStyle/>
+          <a:p>
+            <a:r>
+              <a:rPr lang="en-US" sz="1000" b="1" dirty="0"/>
+              <a:t>Main page (html)</a:t>
+            </a:r>
+            <a:endParaRPr lang="en-SG" sz="1000" b="1" dirty="0"/>
           </a:p>
         </p:txBody>
       </p:sp>

</xml_diff>